<commit_message>
ppt with video + cutted control videos
</commit_message>
<xml_diff>
--- a/media/Panzer Party.pptx
+++ b/media/Panzer Party.pptx
@@ -127,7 +127,7 @@
 <file path=ppt/revisionInfo.xml><?xml version="1.0" encoding="utf-8"?>
 <p1510:revInfo xmlns:a="http://schemas.openxmlformats.org/drawingml/2006/main" xmlns:r="http://schemas.openxmlformats.org/officeDocument/2006/relationships" xmlns:p1510="http://schemas.microsoft.com/office/powerpoint/2015/10/main">
   <p1510:revLst>
-    <p1510:client id="{5634777E-6FEB-4230-B8E3-6F6C6D766434}" v="34" dt="2018-09-11T19:59:08.193"/>
+    <p1510:client id="{5634777E-6FEB-4230-B8E3-6F6C6D766434}" v="73" dt="2018-09-12T03:56:19.612"/>
   </p1510:revLst>
 </p1510:revInfo>
 </file>
@@ -137,12 +137,12 @@
   <pc:docChgLst>
     <pc:chgData name="Max Meuten" userId="1b66fd4c7ecdcb99" providerId="LiveId" clId="{5634777E-6FEB-4230-B8E3-6F6C6D766434}"/>
     <pc:docChg chg="custSel modSld">
-      <pc:chgData name="Max Meuten" userId="1b66fd4c7ecdcb99" providerId="LiveId" clId="{5634777E-6FEB-4230-B8E3-6F6C6D766434}" dt="2018-09-11T19:59:08.193" v="32"/>
+      <pc:chgData name="Max Meuten" userId="1b66fd4c7ecdcb99" providerId="LiveId" clId="{5634777E-6FEB-4230-B8E3-6F6C6D766434}" dt="2018-09-12T03:55:54.544" v="70" actId="167"/>
       <pc:docMkLst>
         <pc:docMk/>
       </pc:docMkLst>
-      <pc:sldChg chg="addSp delSp modSp modAnim">
-        <pc:chgData name="Max Meuten" userId="1b66fd4c7ecdcb99" providerId="LiveId" clId="{5634777E-6FEB-4230-B8E3-6F6C6D766434}" dt="2018-09-11T19:59:08.193" v="32"/>
+      <pc:sldChg chg="addSp delSp modSp delAnim modAnim">
+        <pc:chgData name="Max Meuten" userId="1b66fd4c7ecdcb99" providerId="LiveId" clId="{5634777E-6FEB-4230-B8E3-6F6C6D766434}" dt="2018-09-12T03:55:54.544" v="70" actId="167"/>
         <pc:sldMkLst>
           <pc:docMk/>
           <pc:sldMk cId="4151325810" sldId="268"/>
@@ -187,12 +187,28 @@
             <ac:graphicFrameMk id="36" creationId="{BE5D258A-096B-48E0-ACC0-A9130CAFE418}"/>
           </ac:graphicFrameMkLst>
         </pc:graphicFrameChg>
-        <pc:picChg chg="add mod ord">
-          <ac:chgData name="Max Meuten" userId="1b66fd4c7ecdcb99" providerId="LiveId" clId="{5634777E-6FEB-4230-B8E3-6F6C6D766434}" dt="2018-09-11T19:58:16.615" v="26" actId="167"/>
+        <pc:picChg chg="add del mod ord">
+          <ac:chgData name="Max Meuten" userId="1b66fd4c7ecdcb99" providerId="LiveId" clId="{5634777E-6FEB-4230-B8E3-6F6C6D766434}" dt="2018-09-12T03:55:29.291" v="63" actId="478"/>
           <ac:picMkLst>
             <pc:docMk/>
             <pc:sldMk cId="4151325810" sldId="268"/>
             <ac:picMk id="2" creationId="{C9B109E3-A894-41BA-AAB1-27CA63B9F382}"/>
+          </ac:picMkLst>
+        </pc:picChg>
+        <pc:picChg chg="add del mod">
+          <ac:chgData name="Max Meuten" userId="1b66fd4c7ecdcb99" providerId="LiveId" clId="{5634777E-6FEB-4230-B8E3-6F6C6D766434}" dt="2018-09-12T03:45:01.710" v="62" actId="478"/>
+          <ac:picMkLst>
+            <pc:docMk/>
+            <pc:sldMk cId="4151325810" sldId="268"/>
+            <ac:picMk id="4" creationId="{2B36049F-86FC-4A7C-899B-A240E626D7AF}"/>
+          </ac:picMkLst>
+        </pc:picChg>
+        <pc:picChg chg="add mod ord">
+          <ac:chgData name="Max Meuten" userId="1b66fd4c7ecdcb99" providerId="LiveId" clId="{5634777E-6FEB-4230-B8E3-6F6C6D766434}" dt="2018-09-12T03:55:54.544" v="70" actId="167"/>
+          <ac:picMkLst>
+            <pc:docMk/>
+            <pc:sldMk cId="4151325810" sldId="268"/>
+            <ac:picMk id="4" creationId="{E871C417-233B-4A40-A014-EFE6515CDC90}"/>
           </ac:picMkLst>
         </pc:picChg>
         <pc:picChg chg="del">
@@ -412,7 +428,7 @@
           <a:p>
             <a:fld id="{C68B15F9-1F71-4A1B-8F45-AFDC7418A1CD}" type="datetimeFigureOut">
               <a:rPr lang="de-DE" smtClean="0"/>
-              <a:t>11.09.2018</a:t>
+              <a:t>12.09.2018</a:t>
             </a:fld>
             <a:endParaRPr lang="de-DE"/>
           </a:p>
@@ -610,7 +626,7 @@
           <a:p>
             <a:fld id="{C68B15F9-1F71-4A1B-8F45-AFDC7418A1CD}" type="datetimeFigureOut">
               <a:rPr lang="de-DE" smtClean="0"/>
-              <a:t>11.09.2018</a:t>
+              <a:t>12.09.2018</a:t>
             </a:fld>
             <a:endParaRPr lang="de-DE"/>
           </a:p>
@@ -818,7 +834,7 @@
           <a:p>
             <a:fld id="{C68B15F9-1F71-4A1B-8F45-AFDC7418A1CD}" type="datetimeFigureOut">
               <a:rPr lang="de-DE" smtClean="0"/>
-              <a:t>11.09.2018</a:t>
+              <a:t>12.09.2018</a:t>
             </a:fld>
             <a:endParaRPr lang="de-DE"/>
           </a:p>
@@ -1016,7 +1032,7 @@
           <a:p>
             <a:fld id="{C68B15F9-1F71-4A1B-8F45-AFDC7418A1CD}" type="datetimeFigureOut">
               <a:rPr lang="de-DE" smtClean="0"/>
-              <a:t>11.09.2018</a:t>
+              <a:t>12.09.2018</a:t>
             </a:fld>
             <a:endParaRPr lang="de-DE"/>
           </a:p>
@@ -1291,7 +1307,7 @@
           <a:p>
             <a:fld id="{C68B15F9-1F71-4A1B-8F45-AFDC7418A1CD}" type="datetimeFigureOut">
               <a:rPr lang="de-DE" smtClean="0"/>
-              <a:t>11.09.2018</a:t>
+              <a:t>12.09.2018</a:t>
             </a:fld>
             <a:endParaRPr lang="de-DE"/>
           </a:p>
@@ -1556,7 +1572,7 @@
           <a:p>
             <a:fld id="{C68B15F9-1F71-4A1B-8F45-AFDC7418A1CD}" type="datetimeFigureOut">
               <a:rPr lang="de-DE" smtClean="0"/>
-              <a:t>11.09.2018</a:t>
+              <a:t>12.09.2018</a:t>
             </a:fld>
             <a:endParaRPr lang="de-DE"/>
           </a:p>
@@ -1968,7 +1984,7 @@
           <a:p>
             <a:fld id="{C68B15F9-1F71-4A1B-8F45-AFDC7418A1CD}" type="datetimeFigureOut">
               <a:rPr lang="de-DE" smtClean="0"/>
-              <a:t>11.09.2018</a:t>
+              <a:t>12.09.2018</a:t>
             </a:fld>
             <a:endParaRPr lang="de-DE"/>
           </a:p>
@@ -2109,7 +2125,7 @@
           <a:p>
             <a:fld id="{C68B15F9-1F71-4A1B-8F45-AFDC7418A1CD}" type="datetimeFigureOut">
               <a:rPr lang="de-DE" smtClean="0"/>
-              <a:t>11.09.2018</a:t>
+              <a:t>12.09.2018</a:t>
             </a:fld>
             <a:endParaRPr lang="de-DE"/>
           </a:p>
@@ -2222,7 +2238,7 @@
           <a:p>
             <a:fld id="{C68B15F9-1F71-4A1B-8F45-AFDC7418A1CD}" type="datetimeFigureOut">
               <a:rPr lang="de-DE" smtClean="0"/>
-              <a:t>11.09.2018</a:t>
+              <a:t>12.09.2018</a:t>
             </a:fld>
             <a:endParaRPr lang="de-DE"/>
           </a:p>
@@ -2533,7 +2549,7 @@
           <a:p>
             <a:fld id="{C68B15F9-1F71-4A1B-8F45-AFDC7418A1CD}" type="datetimeFigureOut">
               <a:rPr lang="de-DE" smtClean="0"/>
-              <a:t>11.09.2018</a:t>
+              <a:t>12.09.2018</a:t>
             </a:fld>
             <a:endParaRPr lang="de-DE"/>
           </a:p>
@@ -2821,7 +2837,7 @@
           <a:p>
             <a:fld id="{C68B15F9-1F71-4A1B-8F45-AFDC7418A1CD}" type="datetimeFigureOut">
               <a:rPr lang="de-DE" smtClean="0"/>
-              <a:t>11.09.2018</a:t>
+              <a:t>12.09.2018</a:t>
             </a:fld>
             <a:endParaRPr lang="de-DE"/>
           </a:p>
@@ -3062,7 +3078,7 @@
           <a:p>
             <a:fld id="{C68B15F9-1F71-4A1B-8F45-AFDC7418A1CD}" type="datetimeFigureOut">
               <a:rPr lang="de-DE" smtClean="0"/>
-              <a:t>11.09.2018</a:t>
+              <a:t>12.09.2018</a:t>
             </a:fld>
             <a:endParaRPr lang="de-DE"/>
           </a:p>
@@ -3481,11 +3497,11 @@
       </p:grpSpPr>
       <p:pic>
         <p:nvPicPr>
-          <p:cNvPr id="2" name="2018-09-11 21-56-39">
+          <p:cNvPr id="4" name="ppt_bg">
             <a:hlinkClick r:id="" action="ppaction://media"/>
             <a:extLst>
               <a:ext uri="{FF2B5EF4-FFF2-40B4-BE49-F238E27FC236}">
-                <a16:creationId xmlns:a16="http://schemas.microsoft.com/office/drawing/2014/main" id="{C9B109E3-A894-41BA-AAB1-27CA63B9F382}"/>
+                <a16:creationId xmlns:a16="http://schemas.microsoft.com/office/drawing/2014/main" id="{E871C417-233B-4A40-A014-EFE6515CDC90}"/>
               </a:ext>
             </a:extLst>
           </p:cNvPr>
@@ -3509,7 +3525,7 @@
         </p:blipFill>
         <p:spPr>
           <a:xfrm>
-            <a:off x="0" y="0"/>
+            <a:off x="0" y="-4099"/>
             <a:ext cx="12192000" cy="6858000"/>
           </a:xfrm>
           <a:prstGeom prst="rect">
@@ -5430,9 +5446,9 @@
                                   <p:childTnLst>
                                     <p:cmd type="call" cmd="playFrom(0.0)">
                                       <p:cBhvr>
-                                        <p:cTn id="6" dur="38550" fill="hold"/>
+                                        <p:cTn id="6" dur="40684" fill="hold"/>
                                         <p:tgtEl>
-                                          <p:spTgt spid="2"/>
+                                          <p:spTgt spid="4"/>
                                         </p:tgtEl>
                                       </p:cBhvr>
                                     </p:cmd>
@@ -5463,14 +5479,14 @@
               </p:nextCondLst>
             </p:seq>
             <p:video>
-              <p:cMediaNode vol="80000">
-                <p:cTn id="7" repeatCount="indefinite" fill="hold" display="0">
+              <p:cMediaNode vol="80000" mute="1">
+                <p:cTn id="7" fill="hold" display="0">
                   <p:stCondLst>
                     <p:cond delay="indefinite"/>
                   </p:stCondLst>
                 </p:cTn>
                 <p:tgtEl>
-                  <p:spTgt spid="2"/>
+                  <p:spTgt spid="4"/>
                 </p:tgtEl>
               </p:cMediaNode>
             </p:video>
@@ -5479,7 +5495,7 @@
                 <p:stCondLst>
                   <p:cond evt="onClick" delay="0">
                     <p:tgtEl>
-                      <p:spTgt spid="2"/>
+                      <p:spTgt spid="4"/>
                     </p:tgtEl>
                   </p:cond>
                 </p:stCondLst>
@@ -5509,7 +5525,7 @@
                                       <p:cBhvr>
                                         <p:cTn id="12" dur="1" fill="hold"/>
                                         <p:tgtEl>
-                                          <p:spTgt spid="2"/>
+                                          <p:spTgt spid="4"/>
                                         </p:tgtEl>
                                       </p:cBhvr>
                                     </p:cmd>
@@ -5527,7 +5543,7 @@
               <p:nextCondLst>
                 <p:cond evt="onClick" delay="0">
                   <p:tgtEl>
-                    <p:spTgt spid="2"/>
+                    <p:spTgt spid="4"/>
                   </p:tgtEl>
                 </p:cond>
               </p:nextCondLst>

</xml_diff>